<commit_message>
update Bloc 1 CeTI
</commit_message>
<xml_diff>
--- a/ONIP/onip_b3_traitement_1D/B3_0_Deroulement.pptx
+++ b/ONIP/onip_b3_traitement_1D/B3_0_Deroulement.pptx
@@ -15,6 +15,7 @@
     <p:sldId id="275" r:id="rId9"/>
     <p:sldId id="276" r:id="rId10"/>
     <p:sldId id="278" r:id="rId11"/>
+    <p:sldId id="281" r:id="rId12"/>
   </p:sldIdLst>
   <p:sldSz cx="12192000" cy="6858000"/>
   <p:notesSz cx="6858000" cy="9144000"/>
@@ -277,7 +278,7 @@
           <a:p>
             <a:fld id="{02AC24A9-CCB6-4F8D-B8DB-C2F3692CFA5A}" type="datetimeFigureOut">
               <a:rPr lang="en-US" smtClean="0"/>
-              <a:t>7/21/2023</a:t>
+              <a:t>10/18/2023</a:t>
             </a:fld>
             <a:endParaRPr lang="en-US" dirty="0"/>
           </a:p>
@@ -647,7 +648,7 @@
           <a:p>
             <a:fld id="{02AC24A9-CCB6-4F8D-B8DB-C2F3692CFA5A}" type="datetimeFigureOut">
               <a:rPr lang="en-US" smtClean="0"/>
-              <a:t>7/21/2023</a:t>
+              <a:t>10/18/2023</a:t>
             </a:fld>
             <a:endParaRPr lang="en-US"/>
           </a:p>
@@ -856,7 +857,7 @@
           <a:p>
             <a:fld id="{02AC24A9-CCB6-4F8D-B8DB-C2F3692CFA5A}" type="datetimeFigureOut">
               <a:rPr lang="en-US" smtClean="0"/>
-              <a:t>7/21/2023</a:t>
+              <a:t>10/18/2023</a:t>
             </a:fld>
             <a:endParaRPr lang="en-US"/>
           </a:p>
@@ -1326,7 +1327,7 @@
           <a:p>
             <a:fld id="{02AC24A9-CCB6-4F8D-B8DB-C2F3692CFA5A}" type="datetimeFigureOut">
               <a:rPr lang="en-US" smtClean="0"/>
-              <a:t>7/21/2023</a:t>
+              <a:t>10/18/2023</a:t>
             </a:fld>
             <a:endParaRPr lang="en-US"/>
           </a:p>
@@ -1780,7 +1781,7 @@
           <a:p>
             <a:fld id="{02AC24A9-CCB6-4F8D-B8DB-C2F3692CFA5A}" type="datetimeFigureOut">
               <a:rPr lang="en-US" smtClean="0"/>
-              <a:t>7/21/2023</a:t>
+              <a:t>10/18/2023</a:t>
             </a:fld>
             <a:endParaRPr lang="en-US"/>
           </a:p>
@@ -2312,7 +2313,7 @@
           <a:p>
             <a:fld id="{02AC24A9-CCB6-4F8D-B8DB-C2F3692CFA5A}" type="datetimeFigureOut">
               <a:rPr lang="en-US" smtClean="0"/>
-              <a:t>7/21/2023</a:t>
+              <a:t>10/18/2023</a:t>
             </a:fld>
             <a:endParaRPr lang="en-US"/>
           </a:p>
@@ -3011,7 +3012,7 @@
           <a:p>
             <a:fld id="{02AC24A9-CCB6-4F8D-B8DB-C2F3692CFA5A}" type="datetimeFigureOut">
               <a:rPr lang="en-US" smtClean="0"/>
-              <a:t>7/21/2023</a:t>
+              <a:t>10/18/2023</a:t>
             </a:fld>
             <a:endParaRPr lang="en-US"/>
           </a:p>
@@ -3340,7 +3341,7 @@
           <a:p>
             <a:fld id="{02AC24A9-CCB6-4F8D-B8DB-C2F3692CFA5A}" type="datetimeFigureOut">
               <a:rPr lang="en-US" smtClean="0"/>
-              <a:t>7/21/2023</a:t>
+              <a:t>10/18/2023</a:t>
             </a:fld>
             <a:endParaRPr lang="en-US"/>
           </a:p>
@@ -3453,7 +3454,7 @@
           <a:p>
             <a:fld id="{02AC24A9-CCB6-4F8D-B8DB-C2F3692CFA5A}" type="datetimeFigureOut">
               <a:rPr lang="en-US" smtClean="0"/>
-              <a:t>7/21/2023</a:t>
+              <a:t>10/18/2023</a:t>
             </a:fld>
             <a:endParaRPr lang="en-US"/>
           </a:p>
@@ -3948,7 +3949,7 @@
           <a:p>
             <a:fld id="{02AC24A9-CCB6-4F8D-B8DB-C2F3692CFA5A}" type="datetimeFigureOut">
               <a:rPr lang="en-US" smtClean="0"/>
-              <a:t>7/21/2023</a:t>
+              <a:t>10/18/2023</a:t>
             </a:fld>
             <a:endParaRPr lang="en-US" dirty="0"/>
           </a:p>
@@ -4425,7 +4426,7 @@
           <a:p>
             <a:fld id="{02AC24A9-CCB6-4F8D-B8DB-C2F3692CFA5A}" type="datetimeFigureOut">
               <a:rPr lang="en-US" smtClean="0"/>
-              <a:t>7/21/2023</a:t>
+              <a:t>10/18/2023</a:t>
             </a:fld>
             <a:endParaRPr lang="en-US"/>
           </a:p>
@@ -4668,7 +4669,7 @@
           <a:p>
             <a:fld id="{02AC24A9-CCB6-4F8D-B8DB-C2F3692CFA5A}" type="datetimeFigureOut">
               <a:rPr lang="en-US" smtClean="0"/>
-              <a:t>7/21/2023</a:t>
+              <a:t>10/18/2023</a:t>
             </a:fld>
             <a:endParaRPr lang="en-US"/>
           </a:p>
@@ -6304,6 +6305,100 @@
 </p:sld>
 </file>
 
+<file path=ppt/slides/slide11.xml><?xml version="1.0" encoding="utf-8"?>
+<p:sld xmlns:a="http://schemas.openxmlformats.org/drawingml/2006/main" xmlns:r="http://schemas.openxmlformats.org/officeDocument/2006/relationships" xmlns:p="http://schemas.openxmlformats.org/presentationml/2006/main">
+  <p:cSld>
+    <p:spTree>
+      <p:nvGrpSpPr>
+        <p:cNvPr id="1" name=""/>
+        <p:cNvGrpSpPr/>
+        <p:nvPr/>
+      </p:nvGrpSpPr>
+      <p:grpSpPr>
+        <a:xfrm>
+          <a:off x="0" y="0"/>
+          <a:ext cx="0" cy="0"/>
+          <a:chOff x="0" y="0"/>
+          <a:chExt cx="0" cy="0"/>
+        </a:xfrm>
+      </p:grpSpPr>
+      <p:sp>
+        <p:nvSpPr>
+          <p:cNvPr id="2" name="Titre 1">
+            <a:extLst>
+              <a:ext uri="{FF2B5EF4-FFF2-40B4-BE49-F238E27FC236}">
+                <a16:creationId xmlns:a16="http://schemas.microsoft.com/office/drawing/2014/main" id="{90162AE8-C1B0-5C56-8313-DEE494F38273}"/>
+              </a:ext>
+            </a:extLst>
+          </p:cNvPr>
+          <p:cNvSpPr>
+            <a:spLocks noGrp="1"/>
+          </p:cNvSpPr>
+          <p:nvPr>
+            <p:ph type="title"/>
+          </p:nvPr>
+        </p:nvSpPr>
+        <p:spPr/>
+        <p:txBody>
+          <a:bodyPr/>
+          <a:lstStyle/>
+          <a:p>
+            <a:r>
+              <a:rPr lang="fr-FR" dirty="0"/>
+              <a:t>Conversion en signaux sonores</a:t>
+            </a:r>
+          </a:p>
+        </p:txBody>
+      </p:sp>
+      <p:pic>
+        <p:nvPicPr>
+          <p:cNvPr id="5" name="Image 4" descr="Une image contenant texte&#10;&#10;Description générée automatiquement">
+            <a:extLst>
+              <a:ext uri="{FF2B5EF4-FFF2-40B4-BE49-F238E27FC236}">
+                <a16:creationId xmlns:a16="http://schemas.microsoft.com/office/drawing/2014/main" id="{204ADC40-1D61-539F-22ED-6B21D67FBDE6}"/>
+              </a:ext>
+            </a:extLst>
+          </p:cNvPr>
+          <p:cNvPicPr>
+            <a:picLocks noChangeAspect="1"/>
+          </p:cNvPicPr>
+          <p:nvPr/>
+        </p:nvPicPr>
+        <p:blipFill>
+          <a:blip r:embed="rId2">
+            <a:extLst>
+              <a:ext uri="{28A0092B-C50C-407E-A947-70E740481C1C}">
+                <a14:useLocalDpi xmlns:a14="http://schemas.microsoft.com/office/drawing/2010/main" val="0"/>
+              </a:ext>
+            </a:extLst>
+          </a:blip>
+          <a:stretch>
+            <a:fillRect/>
+          </a:stretch>
+        </p:blipFill>
+        <p:spPr>
+          <a:xfrm>
+            <a:off x="202922" y="5934456"/>
+            <a:ext cx="1825291" cy="749808"/>
+          </a:xfrm>
+          <a:prstGeom prst="rect">
+            <a:avLst/>
+          </a:prstGeom>
+        </p:spPr>
+      </p:pic>
+    </p:spTree>
+    <p:extLst>
+      <p:ext uri="{BB962C8B-B14F-4D97-AF65-F5344CB8AC3E}">
+        <p14:creationId xmlns:p14="http://schemas.microsoft.com/office/powerpoint/2010/main" val="2611207670"/>
+      </p:ext>
+    </p:extLst>
+  </p:cSld>
+  <p:clrMapOvr>
+    <a:masterClrMapping/>
+  </p:clrMapOvr>
+</p:sld>
+</file>
+
 <file path=ppt/slides/slide2.xml><?xml version="1.0" encoding="utf-8"?>
 <p:sld xmlns:a="http://schemas.openxmlformats.org/drawingml/2006/main" xmlns:r="http://schemas.openxmlformats.org/officeDocument/2006/relationships" xmlns:p="http://schemas.openxmlformats.org/presentationml/2006/main">
   <p:cSld>
@@ -10625,6 +10720,56 @@
           </a:p>
         </p:txBody>
       </p:sp>
+      <p:sp>
+        <p:nvSpPr>
+          <p:cNvPr id="4" name="ZoneTexte 3">
+            <a:extLst>
+              <a:ext uri="{FF2B5EF4-FFF2-40B4-BE49-F238E27FC236}">
+                <a16:creationId xmlns:a16="http://schemas.microsoft.com/office/drawing/2014/main" id="{C0FF2E72-A2DB-095F-FEEE-6BEF0C1B2E84}"/>
+              </a:ext>
+            </a:extLst>
+          </p:cNvPr>
+          <p:cNvSpPr txBox="1"/>
+          <p:nvPr/>
+        </p:nvSpPr>
+        <p:spPr>
+          <a:xfrm>
+            <a:off x="3805083" y="6105067"/>
+            <a:ext cx="7600335" cy="646331"/>
+          </a:xfrm>
+          <a:prstGeom prst="rect">
+            <a:avLst/>
+          </a:prstGeom>
+          <a:noFill/>
+        </p:spPr>
+        <p:txBody>
+          <a:bodyPr wrap="square">
+            <a:spAutoFit/>
+          </a:bodyPr>
+          <a:lstStyle/>
+          <a:p>
+            <a:r>
+              <a:rPr lang="fr-FR" sz="1800" b="1" dirty="0">
+                <a:solidFill>
+                  <a:srgbClr val="00B0F0"/>
+                </a:solidFill>
+              </a:rPr>
+              <a:t>BONUS </a:t>
+            </a:r>
+            <a:r>
+              <a:rPr lang="fr-FR" sz="1800" b="1" dirty="0"/>
+              <a:t>: Générer de nouveaux fichiers de signaux modulés </a:t>
+            </a:r>
+            <a:br>
+              <a:rPr lang="fr-FR" sz="1800" b="1" dirty="0"/>
+            </a:br>
+            <a:r>
+              <a:rPr lang="fr-FR" sz="1800" b="1" dirty="0"/>
+              <a:t>				et les démoduler</a:t>
+            </a:r>
+          </a:p>
+        </p:txBody>
+      </p:sp>
     </p:spTree>
     <p:extLst>
       <p:ext uri="{BB962C8B-B14F-4D97-AF65-F5344CB8AC3E}">
@@ -10754,12 +10899,70 @@
           </a:p>
         </p:txBody>
       </p:sp>
+      <p:sp>
+        <p:nvSpPr>
+          <p:cNvPr id="8" name="ZoneTexte 7">
+            <a:extLst>
+              <a:ext uri="{FF2B5EF4-FFF2-40B4-BE49-F238E27FC236}">
+                <a16:creationId xmlns:a16="http://schemas.microsoft.com/office/drawing/2014/main" id="{2F8DDC0A-7585-8CBE-9ED2-C787845E64C5}"/>
+              </a:ext>
+            </a:extLst>
+          </p:cNvPr>
+          <p:cNvSpPr txBox="1"/>
+          <p:nvPr/>
+        </p:nvSpPr>
+        <p:spPr>
+          <a:xfrm>
+            <a:off x="1662010" y="3144411"/>
+            <a:ext cx="6096000" cy="1015663"/>
+          </a:xfrm>
+          <a:prstGeom prst="rect">
+            <a:avLst/>
+          </a:prstGeom>
+          <a:noFill/>
+        </p:spPr>
+        <p:txBody>
+          <a:bodyPr wrap="square">
+            <a:spAutoFit/>
+          </a:bodyPr>
+          <a:lstStyle/>
+          <a:p>
+            <a:pPr marL="342900" indent="-342900">
+              <a:buFont typeface="Arial" panose="020B0604020202020204" pitchFamily="34" charset="0"/>
+              <a:buChar char="•"/>
+            </a:pPr>
+            <a:r>
+              <a:rPr lang="fr-FR" sz="2000" b="1" dirty="0"/>
+              <a:t>Evaluation en séance 4</a:t>
+            </a:r>
+          </a:p>
+          <a:p>
+            <a:pPr lvl="1"/>
+            <a:r>
+              <a:rPr lang="fr-FR" sz="2000" b="1" dirty="0"/>
+              <a:t>Par </a:t>
+            </a:r>
+            <a:r>
+              <a:rPr lang="fr-FR" sz="2000" b="1" dirty="0" err="1"/>
+              <a:t>binome</a:t>
+            </a:r>
+            <a:endParaRPr lang="fr-FR" sz="2000" b="1" dirty="0"/>
+          </a:p>
+          <a:p>
+            <a:pPr marL="342900" indent="-342900">
+              <a:buFontTx/>
+              <a:buChar char="-"/>
+            </a:pPr>
+            <a:endParaRPr lang="fr-FR" sz="2000" b="1" dirty="0"/>
+          </a:p>
+        </p:txBody>
+      </p:sp>
       <p:pic>
         <p:nvPicPr>
-          <p:cNvPr id="10" name="Image 9">
-            <a:extLst>
-              <a:ext uri="{FF2B5EF4-FFF2-40B4-BE49-F238E27FC236}">
-                <a16:creationId xmlns:a16="http://schemas.microsoft.com/office/drawing/2014/main" id="{1D06E8E0-9D1D-812E-12DC-DA74680A575B}"/>
+          <p:cNvPr id="3" name="Image 2">
+            <a:extLst>
+              <a:ext uri="{FF2B5EF4-FFF2-40B4-BE49-F238E27FC236}">
+                <a16:creationId xmlns:a16="http://schemas.microsoft.com/office/drawing/2014/main" id="{B0EAF67F-286B-BC70-EDEC-DAF1C91012C3}"/>
               </a:ext>
             </a:extLst>
           </p:cNvPr>
@@ -10776,294 +10979,14 @@
         </p:blipFill>
         <p:spPr>
           <a:xfrm>
-            <a:off x="1115567" y="2880662"/>
-            <a:ext cx="2083920" cy="2936255"/>
+            <a:off x="6958537" y="1612490"/>
+            <a:ext cx="5030541" cy="5071774"/>
           </a:xfrm>
           <a:prstGeom prst="rect">
             <a:avLst/>
           </a:prstGeom>
         </p:spPr>
       </p:pic>
-      <p:sp>
-        <p:nvSpPr>
-          <p:cNvPr id="11" name="CustomShape 3">
-            <a:extLst>
-              <a:ext uri="{FF2B5EF4-FFF2-40B4-BE49-F238E27FC236}">
-                <a16:creationId xmlns:a16="http://schemas.microsoft.com/office/drawing/2014/main" id="{899C94FC-10AB-E4B3-84B0-AABE54FA3D33}"/>
-              </a:ext>
-            </a:extLst>
-          </p:cNvPr>
-          <p:cNvSpPr/>
-          <p:nvPr/>
-        </p:nvSpPr>
-        <p:spPr>
-          <a:xfrm>
-            <a:off x="4561181" y="4668160"/>
-            <a:ext cx="2459052" cy="677108"/>
-          </a:xfrm>
-          <a:prstGeom prst="rect">
-            <a:avLst/>
-          </a:prstGeom>
-          <a:solidFill>
-            <a:schemeClr val="accent4">
-              <a:lumMod val="60000"/>
-              <a:lumOff val="40000"/>
-            </a:schemeClr>
-          </a:solidFill>
-          <a:ln w="0">
-            <a:noFill/>
-          </a:ln>
-        </p:spPr>
-        <p:style>
-          <a:lnRef idx="0">
-            <a:scrgbClr r="0" g="0" b="0"/>
-          </a:lnRef>
-          <a:fillRef idx="0">
-            <a:scrgbClr r="0" g="0" b="0"/>
-          </a:fillRef>
-          <a:effectRef idx="0">
-            <a:scrgbClr r="0" g="0" b="0"/>
-          </a:effectRef>
-          <a:fontRef idx="minor"/>
-        </p:style>
-        <p:txBody>
-          <a:bodyPr wrap="square" tIns="91440" bIns="91440">
-            <a:spAutoFit/>
-          </a:bodyPr>
-          <a:lstStyle/>
-          <a:p>
-            <a:pPr algn="ctr">
-              <a:lnSpc>
-                <a:spcPct val="100000"/>
-              </a:lnSpc>
-              <a:tabLst>
-                <a:tab pos="0" algn="l"/>
-              </a:tabLst>
-            </a:pPr>
-            <a:r>
-              <a:rPr lang="fr-FR" sz="1600" b="0" strike="noStrike" spc="-1" dirty="0">
-                <a:solidFill>
-                  <a:schemeClr val="tx2"/>
-                </a:solidFill>
-                <a:latin typeface="Arial"/>
-              </a:rPr>
-              <a:t>Mise en œuvre numérique</a:t>
-            </a:r>
-          </a:p>
-        </p:txBody>
-      </p:sp>
-      <p:sp>
-        <p:nvSpPr>
-          <p:cNvPr id="12" name="CustomShape 3">
-            <a:extLst>
-              <a:ext uri="{FF2B5EF4-FFF2-40B4-BE49-F238E27FC236}">
-                <a16:creationId xmlns:a16="http://schemas.microsoft.com/office/drawing/2014/main" id="{C05628E1-986A-6E67-5CCF-5CD8338258BD}"/>
-              </a:ext>
-            </a:extLst>
-          </p:cNvPr>
-          <p:cNvSpPr/>
-          <p:nvPr/>
-        </p:nvSpPr>
-        <p:spPr>
-          <a:xfrm>
-            <a:off x="4561181" y="5465697"/>
-            <a:ext cx="2459052" cy="430887"/>
-          </a:xfrm>
-          <a:prstGeom prst="rect">
-            <a:avLst/>
-          </a:prstGeom>
-          <a:solidFill>
-            <a:schemeClr val="accent4">
-              <a:lumMod val="60000"/>
-              <a:lumOff val="40000"/>
-            </a:schemeClr>
-          </a:solidFill>
-          <a:ln w="0">
-            <a:noFill/>
-          </a:ln>
-        </p:spPr>
-        <p:style>
-          <a:lnRef idx="0">
-            <a:scrgbClr r="0" g="0" b="0"/>
-          </a:lnRef>
-          <a:fillRef idx="0">
-            <a:scrgbClr r="0" g="0" b="0"/>
-          </a:fillRef>
-          <a:effectRef idx="0">
-            <a:scrgbClr r="0" g="0" b="0"/>
-          </a:effectRef>
-          <a:fontRef idx="minor"/>
-        </p:style>
-        <p:txBody>
-          <a:bodyPr wrap="square" tIns="91440" bIns="91440">
-            <a:spAutoFit/>
-          </a:bodyPr>
-          <a:lstStyle/>
-          <a:p>
-            <a:pPr algn="ctr">
-              <a:lnSpc>
-                <a:spcPct val="100000"/>
-              </a:lnSpc>
-              <a:tabLst>
-                <a:tab pos="0" algn="l"/>
-              </a:tabLst>
-            </a:pPr>
-            <a:r>
-              <a:rPr lang="fr-FR" sz="1600" b="0" strike="noStrike" spc="-1" dirty="0">
-                <a:solidFill>
-                  <a:schemeClr val="tx2"/>
-                </a:solidFill>
-                <a:latin typeface="Arial"/>
-              </a:rPr>
-              <a:t>Lien avec la physique</a:t>
-            </a:r>
-          </a:p>
-        </p:txBody>
-      </p:sp>
-      <p:sp>
-        <p:nvSpPr>
-          <p:cNvPr id="13" name="CustomShape 3">
-            <a:extLst>
-              <a:ext uri="{FF2B5EF4-FFF2-40B4-BE49-F238E27FC236}">
-                <a16:creationId xmlns:a16="http://schemas.microsoft.com/office/drawing/2014/main" id="{E39A9320-7D0B-6D7F-A05C-3B25041AF98E}"/>
-              </a:ext>
-            </a:extLst>
-          </p:cNvPr>
-          <p:cNvSpPr/>
-          <p:nvPr/>
-        </p:nvSpPr>
-        <p:spPr>
-          <a:xfrm>
-            <a:off x="4561181" y="4116844"/>
-            <a:ext cx="2459052" cy="430887"/>
-          </a:xfrm>
-          <a:prstGeom prst="rect">
-            <a:avLst/>
-          </a:prstGeom>
-          <a:solidFill>
-            <a:schemeClr val="accent4">
-              <a:lumMod val="60000"/>
-              <a:lumOff val="40000"/>
-            </a:schemeClr>
-          </a:solidFill>
-          <a:ln w="0">
-            <a:noFill/>
-          </a:ln>
-        </p:spPr>
-        <p:style>
-          <a:lnRef idx="0">
-            <a:scrgbClr r="0" g="0" b="0"/>
-          </a:lnRef>
-          <a:fillRef idx="0">
-            <a:scrgbClr r="0" g="0" b="0"/>
-          </a:fillRef>
-          <a:effectRef idx="0">
-            <a:scrgbClr r="0" g="0" b="0"/>
-          </a:effectRef>
-          <a:fontRef idx="minor"/>
-        </p:style>
-        <p:txBody>
-          <a:bodyPr wrap="square" tIns="91440" bIns="91440">
-            <a:spAutoFit/>
-          </a:bodyPr>
-          <a:lstStyle/>
-          <a:p>
-            <a:pPr algn="ctr">
-              <a:lnSpc>
-                <a:spcPct val="100000"/>
-              </a:lnSpc>
-              <a:tabLst>
-                <a:tab pos="0" algn="l"/>
-              </a:tabLst>
-            </a:pPr>
-            <a:r>
-              <a:rPr lang="fr-FR" sz="1600" b="0" strike="noStrike" spc="-1" dirty="0">
-                <a:solidFill>
-                  <a:schemeClr val="tx2"/>
-                </a:solidFill>
-                <a:latin typeface="Arial"/>
-              </a:rPr>
-              <a:t>Analyse du sujet</a:t>
-            </a:r>
-          </a:p>
-        </p:txBody>
-      </p:sp>
-      <p:pic>
-        <p:nvPicPr>
-          <p:cNvPr id="4" name="Image 3">
-            <a:extLst>
-              <a:ext uri="{FF2B5EF4-FFF2-40B4-BE49-F238E27FC236}">
-                <a16:creationId xmlns:a16="http://schemas.microsoft.com/office/drawing/2014/main" id="{BE59BF61-868F-680B-D99E-12024514E70F}"/>
-              </a:ext>
-            </a:extLst>
-          </p:cNvPr>
-          <p:cNvPicPr>
-            <a:picLocks noChangeAspect="1"/>
-          </p:cNvPicPr>
-          <p:nvPr/>
-        </p:nvPicPr>
-        <p:blipFill>
-          <a:blip r:embed="rId4"/>
-          <a:stretch>
-            <a:fillRect/>
-          </a:stretch>
-        </p:blipFill>
-        <p:spPr>
-          <a:xfrm>
-            <a:off x="8146661" y="2123636"/>
-            <a:ext cx="3553726" cy="4722074"/>
-          </a:xfrm>
-          <a:prstGeom prst="rect">
-            <a:avLst/>
-          </a:prstGeom>
-        </p:spPr>
-      </p:pic>
-      <p:sp>
-        <p:nvSpPr>
-          <p:cNvPr id="8" name="ZoneTexte 7">
-            <a:extLst>
-              <a:ext uri="{FF2B5EF4-FFF2-40B4-BE49-F238E27FC236}">
-                <a16:creationId xmlns:a16="http://schemas.microsoft.com/office/drawing/2014/main" id="{2F8DDC0A-7585-8CBE-9ED2-C787845E64C5}"/>
-              </a:ext>
-            </a:extLst>
-          </p:cNvPr>
-          <p:cNvSpPr txBox="1"/>
-          <p:nvPr/>
-        </p:nvSpPr>
-        <p:spPr>
-          <a:xfrm>
-            <a:off x="3471145" y="3242212"/>
-            <a:ext cx="6096000" cy="707886"/>
-          </a:xfrm>
-          <a:prstGeom prst="rect">
-            <a:avLst/>
-          </a:prstGeom>
-          <a:noFill/>
-        </p:spPr>
-        <p:txBody>
-          <a:bodyPr wrap="square">
-            <a:spAutoFit/>
-          </a:bodyPr>
-          <a:lstStyle/>
-          <a:p>
-            <a:pPr marL="342900" indent="-342900">
-              <a:buFont typeface="Arial" panose="020B0604020202020204" pitchFamily="34" charset="0"/>
-              <a:buChar char="•"/>
-            </a:pPr>
-            <a:r>
-              <a:rPr lang="fr-FR" sz="2000" b="1" dirty="0"/>
-              <a:t>Evaluation en séances 3 et 4</a:t>
-            </a:r>
-          </a:p>
-          <a:p>
-            <a:pPr marL="342900" indent="-342900">
-              <a:buFontTx/>
-              <a:buChar char="-"/>
-            </a:pPr>
-            <a:endParaRPr lang="fr-FR" sz="2000" b="1" dirty="0"/>
-          </a:p>
-        </p:txBody>
-      </p:sp>
     </p:spTree>
     <p:extLst>
       <p:ext uri="{BB962C8B-B14F-4D97-AF65-F5344CB8AC3E}">
@@ -11898,7 +11821,213 @@
                 </a:solidFill>
                 <a:latin typeface="Bahnschrift SemiBold" panose="020B0502040204020203" pitchFamily="34" charset="0"/>
               </a:rPr>
-              <a:t>http://lense.institutoptique.fr/outils_nums/</a:t>
+              <a:t>http://lense.institutoptique.fr/ONIP/</a:t>
+            </a:r>
+          </a:p>
+        </p:txBody>
+      </p:sp>
+      <p:sp>
+        <p:nvSpPr>
+          <p:cNvPr id="3" name="Espace réservé du contenu 3">
+            <a:extLst>
+              <a:ext uri="{FF2B5EF4-FFF2-40B4-BE49-F238E27FC236}">
+                <a16:creationId xmlns:a16="http://schemas.microsoft.com/office/drawing/2014/main" id="{C286C4A6-2AB7-32A2-6489-6BBE1FC69413}"/>
+              </a:ext>
+            </a:extLst>
+          </p:cNvPr>
+          <p:cNvSpPr txBox="1">
+            <a:spLocks/>
+          </p:cNvSpPr>
+          <p:nvPr/>
+        </p:nvSpPr>
+        <p:spPr>
+          <a:xfrm>
+            <a:off x="6585644" y="2478024"/>
+            <a:ext cx="4937760" cy="3694176"/>
+          </a:xfrm>
+          <a:prstGeom prst="rect">
+            <a:avLst/>
+          </a:prstGeom>
+        </p:spPr>
+        <p:txBody>
+          <a:bodyPr vert="horz" lIns="91440" tIns="45720" rIns="91440" bIns="45720" rtlCol="0">
+            <a:normAutofit/>
+          </a:bodyPr>
+          <a:lstStyle>
+            <a:lvl1pPr marL="228600" indent="-228600" algn="l" defTabSz="914400" rtl="0" eaLnBrk="1" latinLnBrk="0" hangingPunct="1">
+              <a:lnSpc>
+                <a:spcPct val="110000"/>
+              </a:lnSpc>
+              <a:spcBef>
+                <a:spcPts val="1000"/>
+              </a:spcBef>
+              <a:buFont typeface="Arial" panose="020B0604020202020204" pitchFamily="34" charset="0"/>
+              <a:buChar char="•"/>
+              <a:defRPr sz="2800" kern="1200">
+                <a:solidFill>
+                  <a:schemeClr val="tx1"/>
+                </a:solidFill>
+                <a:latin typeface="+mn-lt"/>
+                <a:ea typeface="+mn-ea"/>
+                <a:cs typeface="+mn-cs"/>
+              </a:defRPr>
+            </a:lvl1pPr>
+            <a:lvl2pPr marL="685800" indent="-228600" algn="l" defTabSz="914400" rtl="0" eaLnBrk="1" latinLnBrk="0" hangingPunct="1">
+              <a:lnSpc>
+                <a:spcPct val="110000"/>
+              </a:lnSpc>
+              <a:spcBef>
+                <a:spcPts val="500"/>
+              </a:spcBef>
+              <a:buFont typeface="Arial" panose="020B0604020202020204" pitchFamily="34" charset="0"/>
+              <a:buChar char="•"/>
+              <a:defRPr sz="2400" kern="1200">
+                <a:solidFill>
+                  <a:schemeClr val="tx1"/>
+                </a:solidFill>
+                <a:latin typeface="+mn-lt"/>
+                <a:ea typeface="+mn-ea"/>
+                <a:cs typeface="+mn-cs"/>
+              </a:defRPr>
+            </a:lvl2pPr>
+            <a:lvl3pPr marL="1143000" indent="-228600" algn="l" defTabSz="914400" rtl="0" eaLnBrk="1" latinLnBrk="0" hangingPunct="1">
+              <a:lnSpc>
+                <a:spcPct val="110000"/>
+              </a:lnSpc>
+              <a:spcBef>
+                <a:spcPts val="500"/>
+              </a:spcBef>
+              <a:buFont typeface="Arial" panose="020B0604020202020204" pitchFamily="34" charset="0"/>
+              <a:buChar char="•"/>
+              <a:defRPr sz="2000" kern="1200">
+                <a:solidFill>
+                  <a:schemeClr val="tx1"/>
+                </a:solidFill>
+                <a:latin typeface="+mn-lt"/>
+                <a:ea typeface="+mn-ea"/>
+                <a:cs typeface="+mn-cs"/>
+              </a:defRPr>
+            </a:lvl3pPr>
+            <a:lvl4pPr marL="1600200" indent="-228600" algn="l" defTabSz="914400" rtl="0" eaLnBrk="1" latinLnBrk="0" hangingPunct="1">
+              <a:lnSpc>
+                <a:spcPct val="110000"/>
+              </a:lnSpc>
+              <a:spcBef>
+                <a:spcPts val="500"/>
+              </a:spcBef>
+              <a:buFont typeface="Arial" panose="020B0604020202020204" pitchFamily="34" charset="0"/>
+              <a:buChar char="•"/>
+              <a:defRPr sz="1800" kern="1200">
+                <a:solidFill>
+                  <a:schemeClr val="tx1"/>
+                </a:solidFill>
+                <a:latin typeface="+mn-lt"/>
+                <a:ea typeface="+mn-ea"/>
+                <a:cs typeface="+mn-cs"/>
+              </a:defRPr>
+            </a:lvl4pPr>
+            <a:lvl5pPr marL="2057400" indent="-228600" algn="l" defTabSz="914400" rtl="0" eaLnBrk="1" latinLnBrk="0" hangingPunct="1">
+              <a:lnSpc>
+                <a:spcPct val="110000"/>
+              </a:lnSpc>
+              <a:spcBef>
+                <a:spcPts val="500"/>
+              </a:spcBef>
+              <a:buFont typeface="Arial" panose="020B0604020202020204" pitchFamily="34" charset="0"/>
+              <a:buChar char="•"/>
+              <a:defRPr sz="1800" kern="1200">
+                <a:solidFill>
+                  <a:schemeClr val="tx1"/>
+                </a:solidFill>
+                <a:latin typeface="+mn-lt"/>
+                <a:ea typeface="+mn-ea"/>
+                <a:cs typeface="+mn-cs"/>
+              </a:defRPr>
+            </a:lvl5pPr>
+            <a:lvl6pPr marL="2514600" indent="-228600" algn="l" defTabSz="914400" rtl="0" eaLnBrk="1" latinLnBrk="0" hangingPunct="1">
+              <a:lnSpc>
+                <a:spcPct val="90000"/>
+              </a:lnSpc>
+              <a:spcBef>
+                <a:spcPts val="500"/>
+              </a:spcBef>
+              <a:buFont typeface="Arial" panose="020B0604020202020204" pitchFamily="34" charset="0"/>
+              <a:buChar char="•"/>
+              <a:defRPr sz="1800" kern="1200">
+                <a:solidFill>
+                  <a:schemeClr val="tx1"/>
+                </a:solidFill>
+                <a:latin typeface="+mn-lt"/>
+                <a:ea typeface="+mn-ea"/>
+                <a:cs typeface="+mn-cs"/>
+              </a:defRPr>
+            </a:lvl6pPr>
+            <a:lvl7pPr marL="2971800" indent="-228600" algn="l" defTabSz="914400" rtl="0" eaLnBrk="1" latinLnBrk="0" hangingPunct="1">
+              <a:lnSpc>
+                <a:spcPct val="90000"/>
+              </a:lnSpc>
+              <a:spcBef>
+                <a:spcPts val="500"/>
+              </a:spcBef>
+              <a:buFont typeface="Arial" panose="020B0604020202020204" pitchFamily="34" charset="0"/>
+              <a:buChar char="•"/>
+              <a:defRPr sz="1800" kern="1200">
+                <a:solidFill>
+                  <a:schemeClr val="tx1"/>
+                </a:solidFill>
+                <a:latin typeface="+mn-lt"/>
+                <a:ea typeface="+mn-ea"/>
+                <a:cs typeface="+mn-cs"/>
+              </a:defRPr>
+            </a:lvl7pPr>
+            <a:lvl8pPr marL="3429000" indent="-228600" algn="l" defTabSz="914400" rtl="0" eaLnBrk="1" latinLnBrk="0" hangingPunct="1">
+              <a:lnSpc>
+                <a:spcPct val="90000"/>
+              </a:lnSpc>
+              <a:spcBef>
+                <a:spcPts val="500"/>
+              </a:spcBef>
+              <a:buFont typeface="Arial" panose="020B0604020202020204" pitchFamily="34" charset="0"/>
+              <a:buChar char="•"/>
+              <a:defRPr sz="1800" kern="1200">
+                <a:solidFill>
+                  <a:schemeClr val="tx1"/>
+                </a:solidFill>
+                <a:latin typeface="+mn-lt"/>
+                <a:ea typeface="+mn-ea"/>
+                <a:cs typeface="+mn-cs"/>
+              </a:defRPr>
+            </a:lvl8pPr>
+            <a:lvl9pPr marL="3886200" indent="-228600" algn="l" defTabSz="914400" rtl="0" eaLnBrk="1" latinLnBrk="0" hangingPunct="1">
+              <a:lnSpc>
+                <a:spcPct val="90000"/>
+              </a:lnSpc>
+              <a:spcBef>
+                <a:spcPts val="500"/>
+              </a:spcBef>
+              <a:buFont typeface="Arial" panose="020B0604020202020204" pitchFamily="34" charset="0"/>
+              <a:buChar char="•"/>
+              <a:defRPr sz="1800" kern="1200">
+                <a:solidFill>
+                  <a:schemeClr val="tx1"/>
+                </a:solidFill>
+                <a:latin typeface="+mn-lt"/>
+                <a:ea typeface="+mn-ea"/>
+                <a:cs typeface="+mn-cs"/>
+              </a:defRPr>
+            </a:lvl9pPr>
+          </a:lstStyle>
+          <a:p>
+            <a:r>
+              <a:rPr lang="fr-FR" dirty="0"/>
+              <a:t>B3_data_03.txt</a:t>
+            </a:r>
+          </a:p>
+          <a:p>
+            <a:pPr lvl="1"/>
+            <a:r>
+              <a:rPr lang="fr-FR" sz="2000" dirty="0"/>
+              <a:t>Format de données binaire 64</a:t>
             </a:r>
           </a:p>
         </p:txBody>

</xml_diff>